<commit_message>
modify picture (not use japanese) #1817
(cherry picked from commit 8709c87a4f8ac6a40459a134d537dad2053f71f3)
</commit_message>
<xml_diff>
--- a/source/UnitTest/ImplementsOfUnitTest/images_ImplementsOfTestByLayer/materialImplementsOfTestByLayer.pptx
+++ b/source/UnitTest/ImplementsOfUnitTest/images_ImplementsOfTestByLayer/materialImplementsOfTestByLayer.pptx
@@ -217,7 +217,7 @@
           <a:p>
             <a:fld id="{3BB47352-BF5A-4CD2-B029-996118CD8E01}" type="datetimeFigureOut">
               <a:rPr kumimoji="1" lang="ja-JP" altLang="en-US" smtClean="0"/>
-              <a:t>2017/11/24</a:t>
+              <a:t>2017/12/7</a:t>
             </a:fld>
             <a:endParaRPr kumimoji="1" lang="ja-JP" altLang="en-US"/>
           </a:p>
@@ -950,7 +950,7 @@
           <a:p>
             <a:fld id="{7B9B12EC-6AA0-374B-A2D3-850081A07A26}" type="datetimeFigureOut">
               <a:rPr kumimoji="1" lang="ja-JP" altLang="en-US" smtClean="0"/>
-              <a:t>2017/11/24</a:t>
+              <a:t>2017/12/7</a:t>
             </a:fld>
             <a:endParaRPr kumimoji="1" lang="ja-JP" altLang="en-US"/>
           </a:p>
@@ -1152,7 +1152,7 @@
           <a:p>
             <a:fld id="{7B9B12EC-6AA0-374B-A2D3-850081A07A26}" type="datetimeFigureOut">
               <a:rPr kumimoji="1" lang="ja-JP" altLang="en-US" smtClean="0"/>
-              <a:t>2017/11/24</a:t>
+              <a:t>2017/12/7</a:t>
             </a:fld>
             <a:endParaRPr kumimoji="1" lang="ja-JP" altLang="en-US"/>
           </a:p>
@@ -1364,7 +1364,7 @@
           <a:p>
             <a:fld id="{7B9B12EC-6AA0-374B-A2D3-850081A07A26}" type="datetimeFigureOut">
               <a:rPr kumimoji="1" lang="ja-JP" altLang="en-US" smtClean="0"/>
-              <a:t>2017/11/24</a:t>
+              <a:t>2017/12/7</a:t>
             </a:fld>
             <a:endParaRPr kumimoji="1" lang="ja-JP" altLang="en-US"/>
           </a:p>
@@ -1566,7 +1566,7 @@
           <a:p>
             <a:fld id="{7B9B12EC-6AA0-374B-A2D3-850081A07A26}" type="datetimeFigureOut">
               <a:rPr kumimoji="1" lang="ja-JP" altLang="en-US" smtClean="0"/>
-              <a:t>2017/11/24</a:t>
+              <a:t>2017/12/7</a:t>
             </a:fld>
             <a:endParaRPr kumimoji="1" lang="ja-JP" altLang="en-US"/>
           </a:p>
@@ -1812,7 +1812,7 @@
           <a:p>
             <a:fld id="{7B9B12EC-6AA0-374B-A2D3-850081A07A26}" type="datetimeFigureOut">
               <a:rPr kumimoji="1" lang="ja-JP" altLang="en-US" smtClean="0"/>
-              <a:t>2017/11/24</a:t>
+              <a:t>2017/12/7</a:t>
             </a:fld>
             <a:endParaRPr kumimoji="1" lang="ja-JP" altLang="en-US"/>
           </a:p>
@@ -2164,7 +2164,7 @@
           <a:p>
             <a:fld id="{7B9B12EC-6AA0-374B-A2D3-850081A07A26}" type="datetimeFigureOut">
               <a:rPr kumimoji="1" lang="ja-JP" altLang="en-US" smtClean="0"/>
-              <a:t>2017/11/24</a:t>
+              <a:t>2017/12/7</a:t>
             </a:fld>
             <a:endParaRPr kumimoji="1" lang="ja-JP" altLang="en-US"/>
           </a:p>
@@ -2650,7 +2650,7 @@
           <a:p>
             <a:fld id="{7B9B12EC-6AA0-374B-A2D3-850081A07A26}" type="datetimeFigureOut">
               <a:rPr kumimoji="1" lang="ja-JP" altLang="en-US" smtClean="0"/>
-              <a:t>2017/11/24</a:t>
+              <a:t>2017/12/7</a:t>
             </a:fld>
             <a:endParaRPr kumimoji="1" lang="ja-JP" altLang="en-US"/>
           </a:p>
@@ -2768,7 +2768,7 @@
           <a:p>
             <a:fld id="{7B9B12EC-6AA0-374B-A2D3-850081A07A26}" type="datetimeFigureOut">
               <a:rPr kumimoji="1" lang="ja-JP" altLang="en-US" smtClean="0"/>
-              <a:t>2017/11/24</a:t>
+              <a:t>2017/12/7</a:t>
             </a:fld>
             <a:endParaRPr kumimoji="1" lang="ja-JP" altLang="en-US"/>
           </a:p>
@@ -2863,7 +2863,7 @@
           <a:p>
             <a:fld id="{7B9B12EC-6AA0-374B-A2D3-850081A07A26}" type="datetimeFigureOut">
               <a:rPr kumimoji="1" lang="ja-JP" altLang="en-US" smtClean="0"/>
-              <a:t>2017/11/24</a:t>
+              <a:t>2017/12/7</a:t>
             </a:fld>
             <a:endParaRPr kumimoji="1" lang="ja-JP" altLang="en-US"/>
           </a:p>
@@ -3172,7 +3172,7 @@
           <a:p>
             <a:fld id="{7B9B12EC-6AA0-374B-A2D3-850081A07A26}" type="datetimeFigureOut">
               <a:rPr kumimoji="1" lang="ja-JP" altLang="en-US" smtClean="0"/>
-              <a:t>2017/11/24</a:t>
+              <a:t>2017/12/7</a:t>
             </a:fld>
             <a:endParaRPr kumimoji="1" lang="ja-JP" altLang="en-US"/>
           </a:p>
@@ -3425,7 +3425,7 @@
           <a:p>
             <a:fld id="{7B9B12EC-6AA0-374B-A2D3-850081A07A26}" type="datetimeFigureOut">
               <a:rPr kumimoji="1" lang="ja-JP" altLang="en-US" smtClean="0"/>
-              <a:t>2017/11/24</a:t>
+              <a:t>2017/12/7</a:t>
             </a:fld>
             <a:endParaRPr kumimoji="1" lang="ja-JP" altLang="en-US"/>
           </a:p>
@@ -3670,7 +3670,7 @@
           <a:p>
             <a:fld id="{7B9B12EC-6AA0-374B-A2D3-850081A07A26}" type="datetimeFigureOut">
               <a:rPr kumimoji="1" lang="ja-JP" altLang="en-US" smtClean="0"/>
-              <a:t>2017/11/24</a:t>
+              <a:t>2017/12/7</a:t>
             </a:fld>
             <a:endParaRPr kumimoji="1" lang="ja-JP" altLang="en-US"/>
           </a:p>
@@ -5302,8 +5302,8 @@
         </p:nvSpPr>
         <p:spPr>
           <a:xfrm>
-            <a:off x="5277677" y="3354059"/>
-            <a:ext cx="2615493" cy="1097899"/>
+            <a:off x="5495271" y="3354059"/>
+            <a:ext cx="2397899" cy="2087150"/>
           </a:xfrm>
           <a:prstGeom prst="rect">
             <a:avLst/>
@@ -5312,7 +5312,7 @@
             <a:schemeClr val="accent2">
               <a:lumMod val="20000"/>
               <a:lumOff val="80000"/>
-              <a:alpha val="50000"/>
+              <a:alpha val="70000"/>
             </a:schemeClr>
           </a:solidFill>
           <a:ln w="38100">
@@ -5366,7 +5366,7 @@
             <a:schemeClr val="accent2">
               <a:lumMod val="20000"/>
               <a:lumOff val="80000"/>
-              <a:alpha val="50000"/>
+              <a:alpha val="70000"/>
             </a:schemeClr>
           </a:solidFill>
           <a:ln w="38100">
@@ -5410,8 +5410,8 @@
         </p:nvSpPr>
         <p:spPr>
           <a:xfrm>
-            <a:off x="5226610" y="3324863"/>
-            <a:ext cx="1590476" cy="646331"/>
+            <a:off x="5504557" y="3351758"/>
+            <a:ext cx="1590476" cy="400110"/>
           </a:xfrm>
           <a:prstGeom prst="rect">
             <a:avLst/>
@@ -5425,16 +5425,18 @@
           <a:lstStyle/>
           <a:p>
             <a:r>
-              <a:rPr lang="ja-JP" altLang="en-US" dirty="0">
+              <a:rPr kumimoji="1" lang="en-US" altLang="ja-JP" sz="2000" dirty="0" smtClean="0">
                 <a:solidFill>
                   <a:srgbClr val="FF0000"/>
                 </a:solidFill>
               </a:rPr>
-              <a:t>テスト対象</a:t>
-            </a:r>
-          </a:p>
-          <a:p>
-            <a:endParaRPr kumimoji="1" lang="ja-JP" altLang="en-US" dirty="0"/>
+              <a:t>Test target</a:t>
+            </a:r>
+            <a:endParaRPr kumimoji="1" lang="ja-JP" altLang="en-US" sz="2000" dirty="0">
+              <a:solidFill>
+                <a:srgbClr val="FF0000"/>
+              </a:solidFill>
+            </a:endParaRPr>
           </a:p>
         </p:txBody>
       </p:sp>
@@ -7263,7 +7265,7 @@
             <a:schemeClr val="accent2">
               <a:lumMod val="20000"/>
               <a:lumOff val="80000"/>
-              <a:alpha val="50000"/>
+              <a:alpha val="70000"/>
             </a:schemeClr>
           </a:solidFill>
           <a:ln w="38100">
@@ -7301,14 +7303,14 @@
       </p:sp>
       <p:sp>
         <p:nvSpPr>
-          <p:cNvPr id="3" name="テキスト ボックス 2"/>
+          <p:cNvPr id="35" name="テキスト ボックス 34"/>
           <p:cNvSpPr txBox="1"/>
           <p:nvPr/>
         </p:nvSpPr>
         <p:spPr>
           <a:xfrm>
-            <a:off x="219729" y="1953405"/>
-            <a:ext cx="1786243" cy="646331"/>
+            <a:off x="165437" y="1889468"/>
+            <a:ext cx="1590476" cy="400110"/>
           </a:xfrm>
           <a:prstGeom prst="rect">
             <a:avLst/>
@@ -7322,16 +7324,18 @@
           <a:lstStyle/>
           <a:p>
             <a:r>
-              <a:rPr lang="ja-JP" altLang="en-US" dirty="0">
+              <a:rPr kumimoji="1" lang="en-US" altLang="ja-JP" sz="2000" dirty="0" smtClean="0">
                 <a:solidFill>
                   <a:srgbClr val="FF0000"/>
                 </a:solidFill>
               </a:rPr>
-              <a:t>テスト対象</a:t>
-            </a:r>
-          </a:p>
-          <a:p>
-            <a:endParaRPr kumimoji="1" lang="ja-JP" altLang="en-US" dirty="0"/>
+              <a:t>Test target</a:t>
+            </a:r>
+            <a:endParaRPr kumimoji="1" lang="ja-JP" altLang="en-US" sz="2000" dirty="0">
+              <a:solidFill>
+                <a:srgbClr val="FF0000"/>
+              </a:solidFill>
+            </a:endParaRPr>
           </a:p>
         </p:txBody>
       </p:sp>
@@ -8918,8 +8922,8 @@
         </p:nvSpPr>
         <p:spPr>
           <a:xfrm>
-            <a:off x="3310720" y="4225379"/>
-            <a:ext cx="2156078" cy="1149908"/>
+            <a:off x="3206869" y="4184855"/>
+            <a:ext cx="2259929" cy="1306812"/>
           </a:xfrm>
           <a:prstGeom prst="rect">
             <a:avLst/>
@@ -8928,7 +8932,7 @@
             <a:schemeClr val="accent2">
               <a:lumMod val="20000"/>
               <a:lumOff val="80000"/>
-              <a:alpha val="50000"/>
+              <a:alpha val="70000"/>
             </a:schemeClr>
           </a:solidFill>
           <a:ln w="38100">
@@ -8966,14 +8970,14 @@
       </p:sp>
       <p:sp>
         <p:nvSpPr>
-          <p:cNvPr id="3" name="テキスト ボックス 2"/>
+          <p:cNvPr id="35" name="テキスト ボックス 34"/>
           <p:cNvSpPr txBox="1"/>
           <p:nvPr/>
         </p:nvSpPr>
         <p:spPr>
           <a:xfrm>
-            <a:off x="3259652" y="4196183"/>
-            <a:ext cx="1311107" cy="646331"/>
+            <a:off x="3195750" y="4112161"/>
+            <a:ext cx="1417477" cy="400110"/>
           </a:xfrm>
           <a:prstGeom prst="rect">
             <a:avLst/>
@@ -8987,16 +8991,18 @@
           <a:lstStyle/>
           <a:p>
             <a:r>
-              <a:rPr lang="ja-JP" altLang="en-US" dirty="0">
+              <a:rPr kumimoji="1" lang="en-US" altLang="ja-JP" sz="2000" dirty="0" smtClean="0">
                 <a:solidFill>
                   <a:srgbClr val="FF0000"/>
                 </a:solidFill>
               </a:rPr>
-              <a:t>テスト対象</a:t>
-            </a:r>
-          </a:p>
-          <a:p>
-            <a:endParaRPr kumimoji="1" lang="ja-JP" altLang="en-US" dirty="0"/>
+              <a:t>Test target</a:t>
+            </a:r>
+            <a:endParaRPr kumimoji="1" lang="ja-JP" altLang="en-US" sz="2000" dirty="0">
+              <a:solidFill>
+                <a:srgbClr val="FF0000"/>
+              </a:solidFill>
+            </a:endParaRPr>
           </a:p>
         </p:txBody>
       </p:sp>

</xml_diff>